<commit_message>
GetOriginsWithDeviceDefs 성능 개선 일부
</commit_message>
<xml_diff>
--- a/DsDotNet/src/UnitTest/UnitTest.Engine/ImportOffice/Sample/s_car.pptx
+++ b/DsDotNet/src/UnitTest/UnitTest.Engine/ImportOffice/Sample/s_car.pptx
@@ -40146,7 +40146,7 @@
 </file>
 
 <file path=ppt/slides/slide3.xml><?xml version="1.0" encoding="utf-8"?>
-<p:sld xmlns:a="http://schemas.openxmlformats.org/drawingml/2006/main" xmlns:r="http://schemas.openxmlformats.org/officeDocument/2006/relationships" xmlns:p="http://schemas.openxmlformats.org/presentationml/2006/main" show="0">
+<p:sld xmlns:a="http://schemas.openxmlformats.org/drawingml/2006/main" xmlns:r="http://schemas.openxmlformats.org/officeDocument/2006/relationships" xmlns:p="http://schemas.openxmlformats.org/presentationml/2006/main">
   <p:cSld>
     <p:spTree>
       <p:nvGrpSpPr>
@@ -42224,7 +42224,7 @@
 </file>
 
 <file path=ppt/slides/slide4.xml><?xml version="1.0" encoding="utf-8"?>
-<p:sld xmlns:a="http://schemas.openxmlformats.org/drawingml/2006/main" xmlns:r="http://schemas.openxmlformats.org/officeDocument/2006/relationships" xmlns:p="http://schemas.openxmlformats.org/presentationml/2006/main" show="0">
+<p:sld xmlns:a="http://schemas.openxmlformats.org/drawingml/2006/main" xmlns:r="http://schemas.openxmlformats.org/officeDocument/2006/relationships" xmlns:p="http://schemas.openxmlformats.org/presentationml/2006/main">
   <p:cSld>
     <p:spTree>
       <p:nvGrpSpPr>
@@ -44302,7 +44302,7 @@
 </file>
 
 <file path=ppt/slides/slide5.xml><?xml version="1.0" encoding="utf-8"?>
-<p:sld xmlns:a="http://schemas.openxmlformats.org/drawingml/2006/main" xmlns:r="http://schemas.openxmlformats.org/officeDocument/2006/relationships" xmlns:p="http://schemas.openxmlformats.org/presentationml/2006/main" show="0">
+<p:sld xmlns:a="http://schemas.openxmlformats.org/drawingml/2006/main" xmlns:r="http://schemas.openxmlformats.org/officeDocument/2006/relationships" xmlns:p="http://schemas.openxmlformats.org/presentationml/2006/main">
   <p:cSld>
     <p:spTree>
       <p:nvGrpSpPr>

</xml_diff>